<commit_message>
vectorize 0 to n
</commit_message>
<xml_diff>
--- a/04/slides.pptx
+++ b/04/slides.pptx
@@ -11556,7 +11556,7 @@
         </p:nvSpPr>
         <p:spPr>
           <a:xfrm>
-            <a:off x="2519680" y="5968365"/>
+            <a:off x="2529840" y="5600065"/>
             <a:ext cx="6499225" cy="368300"/>
           </a:xfrm>
           <a:prstGeom prst="rect">
@@ -11606,6 +11606,50 @@
               <a:t>的加法，从而更加高效</a:t>
             </a:r>
             <a:endParaRPr lang="zh-CN" altLang="en-US"/>
+          </a:p>
+        </p:txBody>
+      </p:sp>
+      <p:sp>
+        <p:nvSpPr>
+          <p:cNvPr id="18" name="Text Box 17"/>
+          <p:cNvSpPr txBox="1"/>
+          <p:nvPr/>
+        </p:nvSpPr>
+        <p:spPr>
+          <a:xfrm>
+            <a:off x="2606040" y="6036310"/>
+            <a:ext cx="6033770" cy="645160"/>
+          </a:xfrm>
+          <a:prstGeom prst="rect">
+            <a:avLst/>
+          </a:prstGeom>
+          <a:noFill/>
+        </p:spPr>
+        <p:txBody>
+          <a:bodyPr wrap="square" rtlCol="0">
+            <a:spAutoFit/>
+          </a:bodyPr>
+          <a:p>
+            <a:r>
+              <a:rPr lang="zh-CN" altLang="en-US"/>
+              <a:t>但这样有个缺点，那就是数组的大小必须为</a:t>
+            </a:r>
+            <a:r>
+              <a:rPr lang="en-US" altLang="zh-CN"/>
+              <a:t> 4 </a:t>
+            </a:r>
+            <a:r>
+              <a:rPr lang="zh-CN" altLang="en-US"/>
+              <a:t>的整数倍</a:t>
+            </a:r>
+            <a:endParaRPr lang="zh-CN" altLang="en-US"/>
+          </a:p>
+          <a:p>
+            <a:r>
+              <a:rPr lang="zh-CN" altLang="en-US"/>
+              <a:t>否则就会写入不希望写入的地址</a:t>
+            </a:r>
+            <a:endParaRPr lang="en-US" altLang="zh-CN"/>
           </a:p>
         </p:txBody>
       </p:sp>
@@ -11614,6 +11658,92 @@
   <p:clrMapOvr>
     <a:masterClrMapping/>
   </p:clrMapOvr>
+  <p:timing>
+    <p:tnLst>
+      <p:par>
+        <p:cTn id="1" dur="indefinite" restart="never" nodeType="tmRoot">
+          <p:childTnLst>
+            <p:seq concurrent="1" nextAc="seek">
+              <p:cTn id="2" dur="indefinite" nodeType="mainSeq">
+                <p:childTnLst>
+                  <p:par>
+                    <p:cTn id="3" fill="hold">
+                      <p:stCondLst>
+                        <p:cond delay="indefinite"/>
+                      </p:stCondLst>
+                      <p:childTnLst>
+                        <p:par>
+                          <p:cTn id="4" fill="hold">
+                            <p:stCondLst>
+                              <p:cond delay="0"/>
+                            </p:stCondLst>
+                            <p:childTnLst>
+                              <p:par>
+                                <p:cTn id="5" presetID="4" presetClass="entr" presetSubtype="16" fill="hold" grpId="0" nodeType="clickEffect">
+                                  <p:stCondLst>
+                                    <p:cond delay="0"/>
+                                  </p:stCondLst>
+                                  <p:childTnLst>
+                                    <p:set>
+                                      <p:cBhvr>
+                                        <p:cTn id="6" dur="1" fill="hold">
+                                          <p:stCondLst>
+                                            <p:cond delay="0"/>
+                                          </p:stCondLst>
+                                        </p:cTn>
+                                        <p:tgtEl>
+                                          <p:spTgt spid="18"/>
+                                        </p:tgtEl>
+                                        <p:attrNameLst>
+                                          <p:attrName>style.visibility</p:attrName>
+                                        </p:attrNameLst>
+                                      </p:cBhvr>
+                                      <p:to>
+                                        <p:strVal val="visible"/>
+                                      </p:to>
+                                    </p:set>
+                                    <p:animEffect transition="in" filter="box(in)">
+                                      <p:cBhvr>
+                                        <p:cTn id="7" dur="2000"/>
+                                        <p:tgtEl>
+                                          <p:spTgt spid="18"/>
+                                        </p:tgtEl>
+                                      </p:cBhvr>
+                                    </p:animEffect>
+                                  </p:childTnLst>
+                                </p:cTn>
+                              </p:par>
+                            </p:childTnLst>
+                          </p:cTn>
+                        </p:par>
+                      </p:childTnLst>
+                    </p:cTn>
+                  </p:par>
+                </p:childTnLst>
+              </p:cTn>
+              <p:prevCondLst>
+                <p:cond evt="onPrev" delay="0">
+                  <p:tgtEl>
+                    <p:sldTgt/>
+                  </p:tgtEl>
+                </p:cond>
+              </p:prevCondLst>
+              <p:nextCondLst>
+                <p:cond evt="onNext" delay="0">
+                  <p:tgtEl>
+                    <p:sldTgt/>
+                  </p:tgtEl>
+                </p:cond>
+              </p:nextCondLst>
+            </p:seq>
+          </p:childTnLst>
+        </p:cTn>
+      </p:par>
+    </p:tnLst>
+    <p:bldLst>
+      <p:bldP spid="18" grpId="0"/>
+    </p:bldLst>
+  </p:timing>
 </p:sld>
 </file>
 
@@ -11651,7 +11781,7 @@
             </a:r>
             <a:r>
               <a:rPr lang="zh-CN" altLang="en-US"/>
-              <a:t>的倍数？</a:t>
+              <a:t>的倍数？边界特判法</a:t>
             </a:r>
             <a:endParaRPr lang="zh-CN" altLang="en-US"/>
           </a:p>
@@ -11675,7 +11805,7 @@
         </p:blipFill>
         <p:spPr>
           <a:xfrm>
-            <a:off x="767080" y="3247390"/>
+            <a:off x="647700" y="3420745"/>
             <a:ext cx="4942205" cy="1507490"/>
           </a:xfrm>
           <a:prstGeom prst="rect">
@@ -11701,7 +11831,7 @@
         </p:blipFill>
         <p:spPr>
           <a:xfrm>
-            <a:off x="5931535" y="1034415"/>
+            <a:off x="6085205" y="1698625"/>
             <a:ext cx="3338830" cy="4443730"/>
           </a:xfrm>
           <a:prstGeom prst="rect">
@@ -11725,7 +11855,7 @@
         </p:blipFill>
         <p:spPr>
           <a:xfrm>
-            <a:off x="9270365" y="899795"/>
+            <a:off x="9424035" y="1564005"/>
             <a:ext cx="2580005" cy="4906010"/>
           </a:xfrm>
           <a:prstGeom prst="rect">
@@ -11741,8 +11871,8 @@
         </p:nvSpPr>
         <p:spPr>
           <a:xfrm>
-            <a:off x="499745" y="1891030"/>
-            <a:ext cx="5288915" cy="922020"/>
+            <a:off x="409575" y="2061210"/>
+            <a:ext cx="5675630" cy="1198880"/>
           </a:xfrm>
           <a:prstGeom prst="rect">
             <a:avLst/>
@@ -11779,7 +11909,7 @@
             </a:r>
             <a:r>
               <a:rPr lang="zh-CN" altLang="en-US"/>
-              <a:t>个元素进行</a:t>
+              <a:t>个元素用</a:t>
             </a:r>
             <a:r>
               <a:rPr lang="en-US" altLang="zh-CN"/>
@@ -11787,22 +11917,22 @@
             </a:r>
             <a:r>
               <a:rPr lang="zh-CN" altLang="en-US"/>
-              <a:t>地填入，</a:t>
+              <a:t>指令填入，每次处理</a:t>
             </a:r>
             <a:r>
               <a:rPr lang="en-US" altLang="zh-CN"/>
-              <a:t>4 </a:t>
-            </a:r>
-            <a:r>
-              <a:rPr lang="zh-CN" altLang="en-US"/>
-              <a:t>个一填</a:t>
+              <a:t> 4 </a:t>
+            </a:r>
+            <a:r>
+              <a:rPr lang="zh-CN" altLang="en-US"/>
+              <a:t>个</a:t>
             </a:r>
             <a:endParaRPr lang="zh-CN" altLang="en-US"/>
           </a:p>
           <a:p>
             <a:r>
               <a:rPr lang="zh-CN" altLang="en-US"/>
-              <a:t>剩下的</a:t>
+              <a:t>剩下</a:t>
             </a:r>
             <a:r>
               <a:rPr lang="en-US" altLang="zh-CN"/>
@@ -11810,15 +11940,59 @@
             </a:r>
             <a:r>
               <a:rPr lang="zh-CN" altLang="en-US"/>
-              <a:t>个元素用传统的标量方式填入，</a:t>
+              <a:t>个元素用传统的标量方式填入，每次处理</a:t>
             </a:r>
             <a:r>
               <a:rPr lang="en-US" altLang="zh-CN"/>
-              <a:t>1 </a:t>
-            </a:r>
-            <a:r>
-              <a:rPr lang="zh-CN" altLang="en-US"/>
-              <a:t>个一填</a:t>
+              <a:t> 1 </a:t>
+            </a:r>
+            <a:r>
+              <a:rPr lang="zh-CN" altLang="en-US"/>
+              <a:t>个</a:t>
+            </a:r>
+            <a:endParaRPr lang="zh-CN" altLang="en-US"/>
+          </a:p>
+          <a:p>
+            <a:r>
+              <a:rPr lang="zh-CN" altLang="en-US"/>
+              <a:t>思想：对边界特殊处理，而对大部分数据能够自由优化</a:t>
+            </a:r>
+            <a:endParaRPr lang="zh-CN" altLang="en-US"/>
+          </a:p>
+        </p:txBody>
+      </p:sp>
+      <p:sp>
+        <p:nvSpPr>
+          <p:cNvPr id="17" name="Text Box 16"/>
+          <p:cNvSpPr txBox="1"/>
+          <p:nvPr/>
+        </p:nvSpPr>
+        <p:spPr>
+          <a:xfrm>
+            <a:off x="1396365" y="5457190"/>
+            <a:ext cx="3791585" cy="922020"/>
+          </a:xfrm>
+          <a:prstGeom prst="rect">
+            <a:avLst/>
+          </a:prstGeom>
+          <a:noFill/>
+        </p:spPr>
+        <p:txBody>
+          <a:bodyPr wrap="square" rtlCol="0">
+            <a:spAutoFit/>
+          </a:bodyPr>
+          <a:p>
+            <a:r>
+              <a:rPr lang="zh-CN" altLang="en-US"/>
+              <a:t>编译器做优化时会自动处理边界特判。如果你是自己手写</a:t>
+            </a:r>
+            <a:r>
+              <a:rPr lang="en-US" altLang="zh-CN"/>
+              <a:t> SIMD </a:t>
+            </a:r>
+            <a:r>
+              <a:rPr lang="zh-CN" altLang="en-US"/>
+              <a:t>指令的话就要考虑一下这个。</a:t>
             </a:r>
             <a:endParaRPr lang="zh-CN" altLang="en-US"/>
           </a:p>
@@ -11829,6 +12003,92 @@
   <p:clrMapOvr>
     <a:masterClrMapping/>
   </p:clrMapOvr>
+  <p:timing>
+    <p:tnLst>
+      <p:par>
+        <p:cTn id="1" dur="indefinite" restart="never" nodeType="tmRoot">
+          <p:childTnLst>
+            <p:seq concurrent="1" nextAc="seek">
+              <p:cTn id="2" dur="indefinite" nodeType="mainSeq">
+                <p:childTnLst>
+                  <p:par>
+                    <p:cTn id="3" fill="hold">
+                      <p:stCondLst>
+                        <p:cond delay="indefinite"/>
+                      </p:stCondLst>
+                      <p:childTnLst>
+                        <p:par>
+                          <p:cTn id="4" fill="hold">
+                            <p:stCondLst>
+                              <p:cond delay="0"/>
+                            </p:stCondLst>
+                            <p:childTnLst>
+                              <p:par>
+                                <p:cTn id="5" presetID="9" presetClass="entr" presetSubtype="0" fill="hold" grpId="0" nodeType="clickEffect">
+                                  <p:stCondLst>
+                                    <p:cond delay="0"/>
+                                  </p:stCondLst>
+                                  <p:childTnLst>
+                                    <p:set>
+                                      <p:cBhvr>
+                                        <p:cTn id="6" dur="1" fill="hold">
+                                          <p:stCondLst>
+                                            <p:cond delay="0"/>
+                                          </p:stCondLst>
+                                        </p:cTn>
+                                        <p:tgtEl>
+                                          <p:spTgt spid="17"/>
+                                        </p:tgtEl>
+                                        <p:attrNameLst>
+                                          <p:attrName>style.visibility</p:attrName>
+                                        </p:attrNameLst>
+                                      </p:cBhvr>
+                                      <p:to>
+                                        <p:strVal val="visible"/>
+                                      </p:to>
+                                    </p:set>
+                                    <p:animEffect transition="in" filter="dissolve">
+                                      <p:cBhvr>
+                                        <p:cTn id="7" dur="500"/>
+                                        <p:tgtEl>
+                                          <p:spTgt spid="17"/>
+                                        </p:tgtEl>
+                                      </p:cBhvr>
+                                    </p:animEffect>
+                                  </p:childTnLst>
+                                </p:cTn>
+                              </p:par>
+                            </p:childTnLst>
+                          </p:cTn>
+                        </p:par>
+                      </p:childTnLst>
+                    </p:cTn>
+                  </p:par>
+                </p:childTnLst>
+              </p:cTn>
+              <p:prevCondLst>
+                <p:cond evt="onPrev" delay="0">
+                  <p:tgtEl>
+                    <p:sldTgt/>
+                  </p:tgtEl>
+                </p:cond>
+              </p:prevCondLst>
+              <p:nextCondLst>
+                <p:cond evt="onNext" delay="0">
+                  <p:tgtEl>
+                    <p:sldTgt/>
+                  </p:tgtEl>
+                </p:cond>
+              </p:nextCondLst>
+            </p:seq>
+          </p:childTnLst>
+        </p:cTn>
+      </p:par>
+    </p:tnLst>
+    <p:bldLst>
+      <p:bldP spid="17" grpId="0"/>
+    </p:bldLst>
+  </p:timing>
 </p:sld>
 </file>
 

</xml_diff>